<commit_message>
updated both pptx files.
</commit_message>
<xml_diff>
--- a/Garrett_County_Webmaps.pptx
+++ b/Garrett_County_Webmaps.pptx
@@ -201,7 +201,7 @@
           <a:p>
             <a:fld id="{FFB5ADF6-C87B-477B-A4F5-13A9980BD675}" type="datetimeFigureOut">
               <a:rPr lang="en-US" smtClean="0"/>
-              <a:t>4/6/2015</a:t>
+              <a:t>4/10/2015</a:t>
             </a:fld>
             <a:endParaRPr lang="en-US"/>
           </a:p>
@@ -1370,7 +1370,7 @@
           <a:p>
             <a:fld id="{CE86230E-36A6-45EA-BE41-84E355EC92C3}" type="datetimeFigureOut">
               <a:rPr lang="en-US" smtClean="0"/>
-              <a:t>4/6/2015</a:t>
+              <a:t>4/10/2015</a:t>
             </a:fld>
             <a:endParaRPr lang="en-US"/>
           </a:p>
@@ -1566,7 +1566,7 @@
           <a:p>
             <a:fld id="{CE86230E-36A6-45EA-BE41-84E355EC92C3}" type="datetimeFigureOut">
               <a:rPr lang="en-US" smtClean="0"/>
-              <a:t>4/6/2015</a:t>
+              <a:t>4/10/2015</a:t>
             </a:fld>
             <a:endParaRPr lang="en-US"/>
           </a:p>
@@ -1751,7 +1751,7 @@
           <a:p>
             <a:fld id="{CE86230E-36A6-45EA-BE41-84E355EC92C3}" type="datetimeFigureOut">
               <a:rPr lang="en-US" smtClean="0"/>
-              <a:t>4/6/2015</a:t>
+              <a:t>4/10/2015</a:t>
             </a:fld>
             <a:endParaRPr lang="en-US"/>
           </a:p>
@@ -1901,7 +1901,7 @@
           <a:p>
             <a:fld id="{CE86230E-36A6-45EA-BE41-84E355EC92C3}" type="datetimeFigureOut">
               <a:rPr lang="en-US" smtClean="0"/>
-              <a:t>4/6/2015</a:t>
+              <a:t>4/10/2015</a:t>
             </a:fld>
             <a:endParaRPr lang="en-US"/>
           </a:p>
@@ -2156,7 +2156,7 @@
           <a:p>
             <a:fld id="{CE86230E-36A6-45EA-BE41-84E355EC92C3}" type="datetimeFigureOut">
               <a:rPr lang="en-US" smtClean="0"/>
-              <a:t>4/6/2015</a:t>
+              <a:t>4/10/2015</a:t>
             </a:fld>
             <a:endParaRPr lang="en-US"/>
           </a:p>
@@ -2565,7 +2565,7 @@
           <a:p>
             <a:fld id="{CE86230E-36A6-45EA-BE41-84E355EC92C3}" type="datetimeFigureOut">
               <a:rPr lang="en-US" smtClean="0"/>
-              <a:t>4/6/2015</a:t>
+              <a:t>4/10/2015</a:t>
             </a:fld>
             <a:endParaRPr lang="en-US"/>
           </a:p>
@@ -3011,7 +3011,7 @@
           <a:p>
             <a:fld id="{CE86230E-36A6-45EA-BE41-84E355EC92C3}" type="datetimeFigureOut">
               <a:rPr lang="en-US" smtClean="0"/>
-              <a:t>4/6/2015</a:t>
+              <a:t>4/10/2015</a:t>
             </a:fld>
             <a:endParaRPr lang="en-US"/>
           </a:p>
@@ -3112,7 +3112,7 @@
           <a:p>
             <a:fld id="{CE86230E-36A6-45EA-BE41-84E355EC92C3}" type="datetimeFigureOut">
               <a:rPr lang="en-US" smtClean="0"/>
-              <a:t>4/6/2015</a:t>
+              <a:t>4/10/2015</a:t>
             </a:fld>
             <a:endParaRPr lang="en-US"/>
           </a:p>
@@ -3233,7 +3233,7 @@
           <a:p>
             <a:fld id="{CE86230E-36A6-45EA-BE41-84E355EC92C3}" type="datetimeFigureOut">
               <a:rPr lang="en-US" smtClean="0"/>
-              <a:t>4/6/2015</a:t>
+              <a:t>4/10/2015</a:t>
             </a:fld>
             <a:endParaRPr lang="en-US"/>
           </a:p>
@@ -3507,7 +3507,7 @@
           <a:p>
             <a:fld id="{CE86230E-36A6-45EA-BE41-84E355EC92C3}" type="datetimeFigureOut">
               <a:rPr lang="en-US" smtClean="0"/>
-              <a:t>4/6/2015</a:t>
+              <a:t>4/10/2015</a:t>
             </a:fld>
             <a:endParaRPr lang="en-US"/>
           </a:p>
@@ -3712,7 +3712,7 @@
           <a:p>
             <a:fld id="{CE86230E-36A6-45EA-BE41-84E355EC92C3}" type="datetimeFigureOut">
               <a:rPr lang="en-US" smtClean="0"/>
-              <a:t>4/6/2015</a:t>
+              <a:t>4/10/2015</a:t>
             </a:fld>
             <a:endParaRPr lang="en-US"/>
           </a:p>
@@ -4821,7 +4821,7 @@
           <a:p>
             <a:fld id="{CE86230E-36A6-45EA-BE41-84E355EC92C3}" type="datetimeFigureOut">
               <a:rPr lang="en-US" smtClean="0"/>
-              <a:t>4/6/2015</a:t>
+              <a:t>4/10/2015</a:t>
             </a:fld>
             <a:endParaRPr lang="en-US"/>
           </a:p>
@@ -5604,8 +5604,13 @@
           <a:p>
             <a:r>
               <a:rPr lang="en-US" dirty="0" smtClean="0"/>
-              <a:t>Short Presentation</a:t>
-            </a:r>
+              <a:t>Short </a:t>
+            </a:r>
+            <a:r>
+              <a:rPr lang="en-US" dirty="0" smtClean="0"/>
+              <a:t>Presentation </a:t>
+            </a:r>
+            <a:endParaRPr lang="en-US" dirty="0" smtClean="0"/>
           </a:p>
           <a:p>
             <a:r>
@@ -5648,6 +5653,49 @@
               <a:t>Agenda:</a:t>
             </a:r>
             <a:endParaRPr lang="en-US" dirty="0"/>
+          </a:p>
+        </p:txBody>
+      </p:sp>
+      <p:sp>
+        <p:nvSpPr>
+          <p:cNvPr id="4" name="Oval 3"/>
+          <p:cNvSpPr/>
+          <p:nvPr/>
+        </p:nvSpPr>
+        <p:spPr>
+          <a:xfrm>
+            <a:off x="4038600" y="1676400"/>
+            <a:ext cx="228600" cy="228600"/>
+          </a:xfrm>
+          <a:prstGeom prst="ellipse">
+            <a:avLst/>
+          </a:prstGeom>
+          <a:solidFill>
+            <a:schemeClr val="accent2"/>
+          </a:solidFill>
+        </p:spPr>
+        <p:style>
+          <a:lnRef idx="2">
+            <a:schemeClr val="accent1">
+              <a:shade val="50000"/>
+            </a:schemeClr>
+          </a:lnRef>
+          <a:fillRef idx="1">
+            <a:schemeClr val="accent1"/>
+          </a:fillRef>
+          <a:effectRef idx="0">
+            <a:schemeClr val="accent1"/>
+          </a:effectRef>
+          <a:fontRef idx="minor">
+            <a:schemeClr val="lt1"/>
+          </a:fontRef>
+        </p:style>
+        <p:txBody>
+          <a:bodyPr rtlCol="0" anchor="ctr"/>
+          <a:lstStyle/>
+          <a:p>
+            <a:pPr algn="ctr"/>
+            <a:endParaRPr lang="en-US"/>
           </a:p>
         </p:txBody>
       </p:sp>
@@ -7538,7 +7586,7 @@
 </file>
 
 <file path=customXml/itemProps1.xml><?xml version="1.0" encoding="utf-8"?>
-<ds:datastoreItem xmlns:ds="http://schemas.openxmlformats.org/officeDocument/2006/customXml" ds:itemID="{951363E6-3891-4BBE-9BF5-51789AEE9F0A}">
+<ds:datastoreItem xmlns:ds="http://schemas.openxmlformats.org/officeDocument/2006/customXml" ds:itemID="{16D24475-A77A-4061-8E5C-679E7DFB9F9F}">
   <ds:schemaRefs>
     <ds:schemaRef ds:uri="ESRI.ArcGIS.Mapping.OfficeIntegration.PowerPointInfo"/>
   </ds:schemaRefs>
@@ -7546,6 +7594,14 @@
 </file>
 
 <file path=customXml/itemProps10.xml><?xml version="1.0" encoding="utf-8"?>
+<ds:datastoreItem xmlns:ds="http://schemas.openxmlformats.org/officeDocument/2006/customXml" ds:itemID="{980B231B-F6A8-47DD-8C48-A776405AAABE}">
+  <ds:schemaRefs>
+    <ds:schemaRef ds:uri="ESRI.ArcGIS.Mapping.OfficeIntegration.PowerPointInfo"/>
+  </ds:schemaRefs>
+</ds:datastoreItem>
+</file>
+
+<file path=customXml/itemProps11.xml><?xml version="1.0" encoding="utf-8"?>
 <ds:datastoreItem xmlns:ds="http://schemas.openxmlformats.org/officeDocument/2006/customXml" ds:itemID="{499860E2-AD47-4080-8871-0962200C120A}">
   <ds:schemaRefs>
     <ds:schemaRef ds:uri="ESRI.ArcGIS.Mapping.OfficeIntegration.PowerPointInfo"/>
@@ -7553,16 +7609,8 @@
 </ds:datastoreItem>
 </file>
 
-<file path=customXml/itemProps11.xml><?xml version="1.0" encoding="utf-8"?>
-<ds:datastoreItem xmlns:ds="http://schemas.openxmlformats.org/officeDocument/2006/customXml" ds:itemID="{6CD39F06-6BEC-47A3-B886-00FBC1C4940F}">
-  <ds:schemaRefs>
-    <ds:schemaRef ds:uri="ESRI.ArcGIS.Mapping.OfficeIntegration.PowerPointInfo"/>
-  </ds:schemaRefs>
-</ds:datastoreItem>
-</file>
-
 <file path=customXml/itemProps12.xml><?xml version="1.0" encoding="utf-8"?>
-<ds:datastoreItem xmlns:ds="http://schemas.openxmlformats.org/officeDocument/2006/customXml" ds:itemID="{C17399CC-25C0-4731-B361-A79042F89183}">
+<ds:datastoreItem xmlns:ds="http://schemas.openxmlformats.org/officeDocument/2006/customXml" ds:itemID="{873570BF-E28C-4265-85DB-25C9048759B1}">
   <ds:schemaRefs>
     <ds:schemaRef ds:uri="ESRI.ArcGIS.Mapping.OfficeIntegration.PowerPointInfo"/>
   </ds:schemaRefs>
@@ -7570,7 +7618,7 @@
 </file>
 
 <file path=customXml/itemProps13.xml><?xml version="1.0" encoding="utf-8"?>
-<ds:datastoreItem xmlns:ds="http://schemas.openxmlformats.org/officeDocument/2006/customXml" ds:itemID="{D3BF99E7-AD9D-4EB1-850D-25302BC286F2}">
+<ds:datastoreItem xmlns:ds="http://schemas.openxmlformats.org/officeDocument/2006/customXml" ds:itemID="{0C5FCC93-6EEB-4734-9201-5BDDC35E3D59}">
   <ds:schemaRefs>
     <ds:schemaRef ds:uri="ESRI.ArcGIS.Mapping.OfficeIntegration.PowerPointInfo"/>
   </ds:schemaRefs>
@@ -7578,7 +7626,7 @@
 </file>
 
 <file path=customXml/itemProps14.xml><?xml version="1.0" encoding="utf-8"?>
-<ds:datastoreItem xmlns:ds="http://schemas.openxmlformats.org/officeDocument/2006/customXml" ds:itemID="{F5A615BC-EDBF-4984-AF79-79FA7C28A570}">
+<ds:datastoreItem xmlns:ds="http://schemas.openxmlformats.org/officeDocument/2006/customXml" ds:itemID="{43EEF44F-E0EC-4C17-AFA2-EC4B4D6DC75F}">
   <ds:schemaRefs>
     <ds:schemaRef ds:uri="ESRI.ArcGIS.Mapping.OfficeIntegration.PowerPointInfo"/>
   </ds:schemaRefs>
@@ -7586,7 +7634,7 @@
 </file>
 
 <file path=customXml/itemProps2.xml><?xml version="1.0" encoding="utf-8"?>
-<ds:datastoreItem xmlns:ds="http://schemas.openxmlformats.org/officeDocument/2006/customXml" ds:itemID="{A2B95696-441C-495B-9479-384705BC8724}">
+<ds:datastoreItem xmlns:ds="http://schemas.openxmlformats.org/officeDocument/2006/customXml" ds:itemID="{D3BF99E7-AD9D-4EB1-850D-25302BC286F2}">
   <ds:schemaRefs>
     <ds:schemaRef ds:uri="ESRI.ArcGIS.Mapping.OfficeIntegration.PowerPointInfo"/>
   </ds:schemaRefs>
@@ -7602,7 +7650,7 @@
 </file>
 
 <file path=customXml/itemProps4.xml><?xml version="1.0" encoding="utf-8"?>
-<ds:datastoreItem xmlns:ds="http://schemas.openxmlformats.org/officeDocument/2006/customXml" ds:itemID="{873570BF-E28C-4265-85DB-25C9048759B1}">
+<ds:datastoreItem xmlns:ds="http://schemas.openxmlformats.org/officeDocument/2006/customXml" ds:itemID="{A298AB81-96EC-424F-BDA7-F62813D51BAA}">
   <ds:schemaRefs>
     <ds:schemaRef ds:uri="ESRI.ArcGIS.Mapping.OfficeIntegration.PowerPointInfo"/>
   </ds:schemaRefs>
@@ -7610,7 +7658,7 @@
 </file>
 
 <file path=customXml/itemProps5.xml><?xml version="1.0" encoding="utf-8"?>
-<ds:datastoreItem xmlns:ds="http://schemas.openxmlformats.org/officeDocument/2006/customXml" ds:itemID="{980B231B-F6A8-47DD-8C48-A776405AAABE}">
+<ds:datastoreItem xmlns:ds="http://schemas.openxmlformats.org/officeDocument/2006/customXml" ds:itemID="{C17399CC-25C0-4731-B361-A79042F89183}">
   <ds:schemaRefs>
     <ds:schemaRef ds:uri="ESRI.ArcGIS.Mapping.OfficeIntegration.PowerPointInfo"/>
   </ds:schemaRefs>
@@ -7618,6 +7666,22 @@
 </file>
 
 <file path=customXml/itemProps6.xml><?xml version="1.0" encoding="utf-8"?>
+<ds:datastoreItem xmlns:ds="http://schemas.openxmlformats.org/officeDocument/2006/customXml" ds:itemID="{A2B95696-441C-495B-9479-384705BC8724}">
+  <ds:schemaRefs>
+    <ds:schemaRef ds:uri="ESRI.ArcGIS.Mapping.OfficeIntegration.PowerPointInfo"/>
+  </ds:schemaRefs>
+</ds:datastoreItem>
+</file>
+
+<file path=customXml/itemProps7.xml><?xml version="1.0" encoding="utf-8"?>
+<ds:datastoreItem xmlns:ds="http://schemas.openxmlformats.org/officeDocument/2006/customXml" ds:itemID="{951363E6-3891-4BBE-9BF5-51789AEE9F0A}">
+  <ds:schemaRefs>
+    <ds:schemaRef ds:uri="ESRI.ArcGIS.Mapping.OfficeIntegration.PowerPointInfo"/>
+  </ds:schemaRefs>
+</ds:datastoreItem>
+</file>
+
+<file path=customXml/itemProps8.xml><?xml version="1.0" encoding="utf-8"?>
 <ds:datastoreItem xmlns:ds="http://schemas.openxmlformats.org/officeDocument/2006/customXml" ds:itemID="{25A17B8D-1480-4F23-87E5-7ED445E7F817}">
   <ds:schemaRefs>
     <ds:schemaRef ds:uri="ESRI.ArcGIS.Mapping.OfficeIntegration.PowerPointInfo"/>
@@ -7625,24 +7689,8 @@
 </ds:datastoreItem>
 </file>
 
-<file path=customXml/itemProps7.xml><?xml version="1.0" encoding="utf-8"?>
-<ds:datastoreItem xmlns:ds="http://schemas.openxmlformats.org/officeDocument/2006/customXml" ds:itemID="{A298AB81-96EC-424F-BDA7-F62813D51BAA}">
-  <ds:schemaRefs>
-    <ds:schemaRef ds:uri="ESRI.ArcGIS.Mapping.OfficeIntegration.PowerPointInfo"/>
-  </ds:schemaRefs>
-</ds:datastoreItem>
-</file>
-
-<file path=customXml/itemProps8.xml><?xml version="1.0" encoding="utf-8"?>
-<ds:datastoreItem xmlns:ds="http://schemas.openxmlformats.org/officeDocument/2006/customXml" ds:itemID="{16D24475-A77A-4061-8E5C-679E7DFB9F9F}">
-  <ds:schemaRefs>
-    <ds:schemaRef ds:uri="ESRI.ArcGIS.Mapping.OfficeIntegration.PowerPointInfo"/>
-  </ds:schemaRefs>
-</ds:datastoreItem>
-</file>
-
 <file path=customXml/itemProps9.xml><?xml version="1.0" encoding="utf-8"?>
-<ds:datastoreItem xmlns:ds="http://schemas.openxmlformats.org/officeDocument/2006/customXml" ds:itemID="{0C5FCC93-6EEB-4734-9201-5BDDC35E3D59}">
+<ds:datastoreItem xmlns:ds="http://schemas.openxmlformats.org/officeDocument/2006/customXml" ds:itemID="{6CD39F06-6BEC-47A3-B886-00FBC1C4940F}">
   <ds:schemaRefs>
     <ds:schemaRef ds:uri="ESRI.ArcGIS.Mapping.OfficeIntegration.PowerPointInfo"/>
   </ds:schemaRefs>

</xml_diff>